<commit_message>
Uprava formatovania P7. Najnovsie programy v DOC + summary po anglicky. Trieda do prezentacie.
</commit_message>
<xml_diff>
--- a/doc/prezentacia bez videa.pptx
+++ b/doc/prezentacia bez videa.pptx
@@ -218,7 +218,7 @@
           <a:p>
             <a:fld id="{066F1851-2AD6-4D09-9233-A01AF90887B5}" type="datetimeFigureOut">
               <a:rPr lang="sk-SK" smtClean="0"/>
-              <a:t>12. 5. 2016</a:t>
+              <a:t>14. 5. 2016</a:t>
             </a:fld>
             <a:endParaRPr lang="sk-SK"/>
           </a:p>
@@ -7288,7 +7288,7 @@
           <a:p>
             <a:fld id="{5916A7E2-E217-4A91-9677-B71B871DF971}" type="datetimeFigureOut">
               <a:rPr lang="sk-SK" smtClean="0"/>
-              <a:t>12. 5. 2016</a:t>
+              <a:t>14. 5. 2016</a:t>
             </a:fld>
             <a:endParaRPr lang="sk-SK"/>
           </a:p>
@@ -7484,7 +7484,7 @@
           <a:p>
             <a:fld id="{5916A7E2-E217-4A91-9677-B71B871DF971}" type="datetimeFigureOut">
               <a:rPr lang="sk-SK" smtClean="0"/>
-              <a:t>12. 5. 2016</a:t>
+              <a:t>14. 5. 2016</a:t>
             </a:fld>
             <a:endParaRPr lang="sk-SK"/>
           </a:p>
@@ -7669,7 +7669,7 @@
           <a:p>
             <a:fld id="{5916A7E2-E217-4A91-9677-B71B871DF971}" type="datetimeFigureOut">
               <a:rPr lang="sk-SK" smtClean="0"/>
-              <a:t>12. 5. 2016</a:t>
+              <a:t>14. 5. 2016</a:t>
             </a:fld>
             <a:endParaRPr lang="sk-SK"/>
           </a:p>
@@ -7819,7 +7819,7 @@
           <a:p>
             <a:fld id="{5916A7E2-E217-4A91-9677-B71B871DF971}" type="datetimeFigureOut">
               <a:rPr lang="sk-SK" smtClean="0"/>
-              <a:t>12. 5. 2016</a:t>
+              <a:t>14. 5. 2016</a:t>
             </a:fld>
             <a:endParaRPr lang="sk-SK"/>
           </a:p>
@@ -8074,7 +8074,7 @@
           <a:p>
             <a:fld id="{5916A7E2-E217-4A91-9677-B71B871DF971}" type="datetimeFigureOut">
               <a:rPr lang="sk-SK" smtClean="0"/>
-              <a:t>12. 5. 2016</a:t>
+              <a:t>14. 5. 2016</a:t>
             </a:fld>
             <a:endParaRPr lang="sk-SK"/>
           </a:p>
@@ -8483,7 +8483,7 @@
           <a:p>
             <a:fld id="{5916A7E2-E217-4A91-9677-B71B871DF971}" type="datetimeFigureOut">
               <a:rPr lang="sk-SK" smtClean="0"/>
-              <a:t>12. 5. 2016</a:t>
+              <a:t>14. 5. 2016</a:t>
             </a:fld>
             <a:endParaRPr lang="sk-SK"/>
           </a:p>
@@ -8929,7 +8929,7 @@
           <a:p>
             <a:fld id="{5916A7E2-E217-4A91-9677-B71B871DF971}" type="datetimeFigureOut">
               <a:rPr lang="sk-SK" smtClean="0"/>
-              <a:t>12. 5. 2016</a:t>
+              <a:t>14. 5. 2016</a:t>
             </a:fld>
             <a:endParaRPr lang="sk-SK"/>
           </a:p>
@@ -9030,7 +9030,7 @@
           <a:p>
             <a:fld id="{5916A7E2-E217-4A91-9677-B71B871DF971}" type="datetimeFigureOut">
               <a:rPr lang="sk-SK" smtClean="0"/>
-              <a:t>12. 5. 2016</a:t>
+              <a:t>14. 5. 2016</a:t>
             </a:fld>
             <a:endParaRPr lang="sk-SK"/>
           </a:p>
@@ -9151,7 +9151,7 @@
           <a:p>
             <a:fld id="{5916A7E2-E217-4A91-9677-B71B871DF971}" type="datetimeFigureOut">
               <a:rPr lang="sk-SK" smtClean="0"/>
-              <a:t>12. 5. 2016</a:t>
+              <a:t>14. 5. 2016</a:t>
             </a:fld>
             <a:endParaRPr lang="sk-SK"/>
           </a:p>
@@ -9425,7 +9425,7 @@
           <a:p>
             <a:fld id="{5916A7E2-E217-4A91-9677-B71B871DF971}" type="datetimeFigureOut">
               <a:rPr lang="sk-SK" smtClean="0"/>
-              <a:t>12. 5. 2016</a:t>
+              <a:t>14. 5. 2016</a:t>
             </a:fld>
             <a:endParaRPr lang="sk-SK"/>
           </a:p>
@@ -9630,7 +9630,7 @@
           <a:p>
             <a:fld id="{5916A7E2-E217-4A91-9677-B71B871DF971}" type="datetimeFigureOut">
               <a:rPr lang="sk-SK" smtClean="0"/>
-              <a:t>12. 5. 2016</a:t>
+              <a:t>14. 5. 2016</a:t>
             </a:fld>
             <a:endParaRPr lang="sk-SK"/>
           </a:p>
@@ -10739,7 +10739,7 @@
           <a:p>
             <a:fld id="{5916A7E2-E217-4A91-9677-B71B871DF971}" type="datetimeFigureOut">
               <a:rPr lang="sk-SK" smtClean="0"/>
-              <a:t>12. 5. 2016</a:t>
+              <a:t>14. 5. 2016</a:t>
             </a:fld>
             <a:endParaRPr lang="sk-SK"/>
           </a:p>
@@ -11198,7 +11198,17 @@
           <a:p>
             <a:r>
               <a:rPr lang="sk-SK" dirty="0" smtClean="0"/>
-              <a:t>Ján Mederly</a:t>
+              <a:t>Ján </a:t>
+            </a:r>
+            <a:r>
+              <a:rPr lang="sk-SK" dirty="0" smtClean="0"/>
+              <a:t>Mederly</a:t>
+            </a:r>
+          </a:p>
+          <a:p>
+            <a:r>
+              <a:rPr lang="sk-SK" dirty="0" smtClean="0"/>
+              <a:t>6.E</a:t>
             </a:r>
             <a:endParaRPr lang="sk-SK" dirty="0"/>
           </a:p>

</xml_diff>